<commit_message>
reran some tests, finished presentation
</commit_message>
<xml_diff>
--- a/ApresentaçãoTCC.pptx
+++ b/ApresentaçãoTCC.pptx
@@ -5,7 +5,7 @@
     <p:sldMasterId id="2147483660" r:id="rId1"/>
   </p:sldMasterIdLst>
   <p:notesMasterIdLst>
-    <p:notesMasterId r:id="rId8"/>
+    <p:notesMasterId r:id="rId31"/>
   </p:notesMasterIdLst>
   <p:sldIdLst>
     <p:sldId id="256" r:id="rId2"/>
@@ -14,6 +14,29 @@
     <p:sldId id="260" r:id="rId5"/>
     <p:sldId id="261" r:id="rId6"/>
     <p:sldId id="262" r:id="rId7"/>
+    <p:sldId id="263" r:id="rId8"/>
+    <p:sldId id="265" r:id="rId9"/>
+    <p:sldId id="268" r:id="rId10"/>
+    <p:sldId id="269" r:id="rId11"/>
+    <p:sldId id="270" r:id="rId12"/>
+    <p:sldId id="271" r:id="rId13"/>
+    <p:sldId id="272" r:id="rId14"/>
+    <p:sldId id="273" r:id="rId15"/>
+    <p:sldId id="274" r:id="rId16"/>
+    <p:sldId id="275" r:id="rId17"/>
+    <p:sldId id="276" r:id="rId18"/>
+    <p:sldId id="277" r:id="rId19"/>
+    <p:sldId id="278" r:id="rId20"/>
+    <p:sldId id="279" r:id="rId21"/>
+    <p:sldId id="280" r:id="rId22"/>
+    <p:sldId id="281" r:id="rId23"/>
+    <p:sldId id="282" r:id="rId24"/>
+    <p:sldId id="283" r:id="rId25"/>
+    <p:sldId id="284" r:id="rId26"/>
+    <p:sldId id="285" r:id="rId27"/>
+    <p:sldId id="286" r:id="rId28"/>
+    <p:sldId id="287" r:id="rId29"/>
+    <p:sldId id="288" r:id="rId30"/>
   </p:sldIdLst>
   <p:sldSz cx="9144000" cy="6858000" type="screen4x3"/>
   <p:notesSz cx="6858000" cy="9144000"/>
@@ -652,7 +675,7 @@
           <a:p>
             <a:fld id="{2E700DB3-DBF0-4086-B675-117E7A9610B8}" type="datetimeFigureOut">
               <a:rPr lang="pt-BR" smtClean="0"/>
-              <a:t>19/10/2021</a:t>
+              <a:t>20/10/2021</a:t>
             </a:fld>
             <a:endParaRPr lang="pt-BR"/>
           </a:p>
@@ -817,7 +840,7 @@
           <a:p>
             <a:fld id="{2E700DB3-DBF0-4086-B675-117E7A9610B8}" type="datetimeFigureOut">
               <a:rPr lang="pt-BR" smtClean="0"/>
-              <a:t>19/10/2021</a:t>
+              <a:t>20/10/2021</a:t>
             </a:fld>
             <a:endParaRPr lang="pt-BR"/>
           </a:p>
@@ -992,7 +1015,7 @@
           <a:p>
             <a:fld id="{2E700DB3-DBF0-4086-B675-117E7A9610B8}" type="datetimeFigureOut">
               <a:rPr lang="pt-BR" smtClean="0"/>
-              <a:t>19/10/2021</a:t>
+              <a:t>20/10/2021</a:t>
             </a:fld>
             <a:endParaRPr lang="pt-BR"/>
           </a:p>
@@ -1157,7 +1180,7 @@
           <a:p>
             <a:fld id="{2E700DB3-DBF0-4086-B675-117E7A9610B8}" type="datetimeFigureOut">
               <a:rPr lang="pt-BR" smtClean="0"/>
-              <a:t>19/10/2021</a:t>
+              <a:t>20/10/2021</a:t>
             </a:fld>
             <a:endParaRPr lang="pt-BR"/>
           </a:p>
@@ -1396,7 +1419,7 @@
           <a:p>
             <a:fld id="{2E700DB3-DBF0-4086-B675-117E7A9610B8}" type="datetimeFigureOut">
               <a:rPr lang="pt-BR" smtClean="0"/>
-              <a:t>19/10/2021</a:t>
+              <a:t>20/10/2021</a:t>
             </a:fld>
             <a:endParaRPr lang="pt-BR"/>
           </a:p>
@@ -1486,7 +1509,7 @@
           <a:p>
             <a:fld id="{2E700DB3-DBF0-4086-B675-117E7A9610B8}" type="datetimeFigureOut">
               <a:rPr lang="pt-BR" smtClean="0"/>
-              <a:t>19/10/2021</a:t>
+              <a:t>20/10/2021</a:t>
             </a:fld>
             <a:endParaRPr lang="pt-BR"/>
           </a:p>
@@ -1860,7 +1883,7 @@
           <a:p>
             <a:fld id="{2E700DB3-DBF0-4086-B675-117E7A9610B8}" type="datetimeFigureOut">
               <a:rPr lang="pt-BR" smtClean="0"/>
-              <a:t>19/10/2021</a:t>
+              <a:t>20/10/2021</a:t>
             </a:fld>
             <a:endParaRPr lang="pt-BR"/>
           </a:p>
@@ -2115,7 +2138,7 @@
           <a:p>
             <a:fld id="{2E700DB3-DBF0-4086-B675-117E7A9610B8}" type="datetimeFigureOut">
               <a:rPr lang="pt-BR" smtClean="0"/>
-              <a:t>19/10/2021</a:t>
+              <a:t>20/10/2021</a:t>
             </a:fld>
             <a:endParaRPr lang="pt-BR"/>
           </a:p>
@@ -2205,7 +2228,7 @@
           <a:p>
             <a:fld id="{2E700DB3-DBF0-4086-B675-117E7A9610B8}" type="datetimeFigureOut">
               <a:rPr lang="pt-BR" smtClean="0"/>
-              <a:t>19/10/2021</a:t>
+              <a:t>20/10/2021</a:t>
             </a:fld>
             <a:endParaRPr lang="pt-BR"/>
           </a:p>
@@ -2479,7 +2502,7 @@
           <a:p>
             <a:fld id="{2E700DB3-DBF0-4086-B675-117E7A9610B8}" type="datetimeFigureOut">
               <a:rPr lang="pt-BR" smtClean="0"/>
-              <a:t>19/10/2021</a:t>
+              <a:t>20/10/2021</a:t>
             </a:fld>
             <a:endParaRPr lang="pt-BR"/>
           </a:p>
@@ -2751,7 +2774,7 @@
           <a:p>
             <a:fld id="{2E700DB3-DBF0-4086-B675-117E7A9610B8}" type="datetimeFigureOut">
               <a:rPr lang="pt-BR" smtClean="0"/>
-              <a:t>19/10/2021</a:t>
+              <a:t>20/10/2021</a:t>
             </a:fld>
             <a:endParaRPr lang="pt-BR"/>
           </a:p>
@@ -3051,7 +3074,7 @@
           <a:p>
             <a:fld id="{2E700DB3-DBF0-4086-B675-117E7A9610B8}" type="datetimeFigureOut">
               <a:rPr lang="pt-BR" smtClean="0"/>
-              <a:t>19/10/2021</a:t>
+              <a:t>20/10/2021</a:t>
             </a:fld>
             <a:endParaRPr lang="pt-BR"/>
           </a:p>
@@ -3563,6 +3586,846 @@
 </p:sld>
 </file>
 
+<file path=ppt/slides/slide10.xml><?xml version="1.0" encoding="utf-8"?>
+<p:sld xmlns:a="http://schemas.openxmlformats.org/drawingml/2006/main" xmlns:r="http://schemas.openxmlformats.org/officeDocument/2006/relationships" xmlns:p="http://schemas.openxmlformats.org/presentationml/2006/main">
+  <p:cSld>
+    <p:spTree>
+      <p:nvGrpSpPr>
+        <p:cNvPr id="1" name=""/>
+        <p:cNvGrpSpPr/>
+        <p:nvPr/>
+      </p:nvGrpSpPr>
+      <p:grpSpPr>
+        <a:xfrm>
+          <a:off x="0" y="0"/>
+          <a:ext cx="0" cy="0"/>
+          <a:chOff x="0" y="0"/>
+          <a:chExt cx="0" cy="0"/>
+        </a:xfrm>
+      </p:grpSpPr>
+      <p:sp>
+        <p:nvSpPr>
+          <p:cNvPr id="2" name="Título 1"/>
+          <p:cNvSpPr>
+            <a:spLocks noGrp="1"/>
+          </p:cNvSpPr>
+          <p:nvPr>
+            <p:ph type="title"/>
+          </p:nvPr>
+        </p:nvSpPr>
+        <p:spPr/>
+        <p:txBody>
+          <a:bodyPr/>
+          <a:lstStyle/>
+          <a:p>
+            <a:r>
+              <a:rPr lang="pt-BR" dirty="0" smtClean="0"/>
+              <a:t>Fórmula 1</a:t>
+            </a:r>
+            <a:endParaRPr lang="pt-BR" dirty="0"/>
+          </a:p>
+        </p:txBody>
+      </p:sp>
+      <p:pic>
+        <p:nvPicPr>
+          <p:cNvPr id="5" name="Espaço Reservado para Conteúdo 4"/>
+          <p:cNvPicPr>
+            <a:picLocks noGrp="1" noChangeAspect="1"/>
+          </p:cNvPicPr>
+          <p:nvPr>
+            <p:ph idx="1"/>
+          </p:nvPr>
+        </p:nvPicPr>
+        <p:blipFill>
+          <a:blip r:embed="rId2">
+            <a:extLst>
+              <a:ext uri="{28A0092B-C50C-407E-A947-70E740481C1C}">
+                <a14:useLocalDpi xmlns:a14="http://schemas.microsoft.com/office/drawing/2010/main" val="0"/>
+              </a:ext>
+            </a:extLst>
+          </a:blip>
+          <a:stretch>
+            <a:fillRect/>
+          </a:stretch>
+        </p:blipFill>
+        <p:spPr>
+          <a:xfrm>
+            <a:off x="2095024" y="2770188"/>
+            <a:ext cx="4953951" cy="3538537"/>
+          </a:xfrm>
+        </p:spPr>
+      </p:pic>
+    </p:spTree>
+    <p:extLst>
+      <p:ext uri="{BB962C8B-B14F-4D97-AF65-F5344CB8AC3E}">
+        <p14:creationId xmlns:p14="http://schemas.microsoft.com/office/powerpoint/2010/main" val="2306154666"/>
+      </p:ext>
+    </p:extLst>
+  </p:cSld>
+  <p:clrMapOvr>
+    <a:masterClrMapping/>
+  </p:clrMapOvr>
+</p:sld>
+</file>
+
+<file path=ppt/slides/slide11.xml><?xml version="1.0" encoding="utf-8"?>
+<p:sld xmlns:a="http://schemas.openxmlformats.org/drawingml/2006/main" xmlns:r="http://schemas.openxmlformats.org/officeDocument/2006/relationships" xmlns:p="http://schemas.openxmlformats.org/presentationml/2006/main">
+  <p:cSld>
+    <p:spTree>
+      <p:nvGrpSpPr>
+        <p:cNvPr id="1" name=""/>
+        <p:cNvGrpSpPr/>
+        <p:nvPr/>
+      </p:nvGrpSpPr>
+      <p:grpSpPr>
+        <a:xfrm>
+          <a:off x="0" y="0"/>
+          <a:ext cx="0" cy="0"/>
+          <a:chOff x="0" y="0"/>
+          <a:chExt cx="0" cy="0"/>
+        </a:xfrm>
+      </p:grpSpPr>
+      <p:sp>
+        <p:nvSpPr>
+          <p:cNvPr id="2" name="Título 1"/>
+          <p:cNvSpPr>
+            <a:spLocks noGrp="1"/>
+          </p:cNvSpPr>
+          <p:nvPr>
+            <p:ph type="title"/>
+          </p:nvPr>
+        </p:nvSpPr>
+        <p:spPr/>
+        <p:txBody>
+          <a:bodyPr/>
+          <a:lstStyle/>
+          <a:p>
+            <a:r>
+              <a:rPr lang="pt-BR" dirty="0" smtClean="0"/>
+              <a:t>Fórmula 1</a:t>
+            </a:r>
+            <a:endParaRPr lang="pt-BR" dirty="0"/>
+          </a:p>
+        </p:txBody>
+      </p:sp>
+      <p:pic>
+        <p:nvPicPr>
+          <p:cNvPr id="4" name="Espaço Reservado para Conteúdo 3"/>
+          <p:cNvPicPr>
+            <a:picLocks noGrp="1" noChangeAspect="1"/>
+          </p:cNvPicPr>
+          <p:nvPr>
+            <p:ph idx="1"/>
+          </p:nvPr>
+        </p:nvPicPr>
+        <p:blipFill>
+          <a:blip r:embed="rId2">
+            <a:extLst>
+              <a:ext uri="{28A0092B-C50C-407E-A947-70E740481C1C}">
+                <a14:useLocalDpi xmlns:a14="http://schemas.microsoft.com/office/drawing/2010/main" val="0"/>
+              </a:ext>
+            </a:extLst>
+          </a:blip>
+          <a:stretch>
+            <a:fillRect/>
+          </a:stretch>
+        </p:blipFill>
+        <p:spPr>
+          <a:xfrm>
+            <a:off x="2095024" y="2770188"/>
+            <a:ext cx="4953951" cy="3538537"/>
+          </a:xfrm>
+        </p:spPr>
+      </p:pic>
+    </p:spTree>
+    <p:extLst>
+      <p:ext uri="{BB962C8B-B14F-4D97-AF65-F5344CB8AC3E}">
+        <p14:creationId xmlns:p14="http://schemas.microsoft.com/office/powerpoint/2010/main" val="3971943308"/>
+      </p:ext>
+    </p:extLst>
+  </p:cSld>
+  <p:clrMapOvr>
+    <a:masterClrMapping/>
+  </p:clrMapOvr>
+</p:sld>
+</file>
+
+<file path=ppt/slides/slide12.xml><?xml version="1.0" encoding="utf-8"?>
+<p:sld xmlns:a="http://schemas.openxmlformats.org/drawingml/2006/main" xmlns:r="http://schemas.openxmlformats.org/officeDocument/2006/relationships" xmlns:p="http://schemas.openxmlformats.org/presentationml/2006/main">
+  <p:cSld>
+    <p:spTree>
+      <p:nvGrpSpPr>
+        <p:cNvPr id="1" name=""/>
+        <p:cNvGrpSpPr/>
+        <p:nvPr/>
+      </p:nvGrpSpPr>
+      <p:grpSpPr>
+        <a:xfrm>
+          <a:off x="0" y="0"/>
+          <a:ext cx="0" cy="0"/>
+          <a:chOff x="0" y="0"/>
+          <a:chExt cx="0" cy="0"/>
+        </a:xfrm>
+      </p:grpSpPr>
+      <p:sp>
+        <p:nvSpPr>
+          <p:cNvPr id="2" name="Título 1"/>
+          <p:cNvSpPr>
+            <a:spLocks noGrp="1"/>
+          </p:cNvSpPr>
+          <p:nvPr>
+            <p:ph type="title"/>
+          </p:nvPr>
+        </p:nvSpPr>
+        <p:spPr/>
+        <p:txBody>
+          <a:bodyPr/>
+          <a:lstStyle/>
+          <a:p>
+            <a:r>
+              <a:rPr lang="pt-BR" dirty="0" smtClean="0"/>
+              <a:t>Fórmula 1</a:t>
+            </a:r>
+            <a:endParaRPr lang="pt-BR" dirty="0"/>
+          </a:p>
+        </p:txBody>
+      </p:sp>
+      <p:pic>
+        <p:nvPicPr>
+          <p:cNvPr id="4" name="Espaço Reservado para Conteúdo 3"/>
+          <p:cNvPicPr>
+            <a:picLocks noGrp="1" noChangeAspect="1"/>
+          </p:cNvPicPr>
+          <p:nvPr>
+            <p:ph idx="1"/>
+          </p:nvPr>
+        </p:nvPicPr>
+        <p:blipFill>
+          <a:blip r:embed="rId2">
+            <a:extLst>
+              <a:ext uri="{28A0092B-C50C-407E-A947-70E740481C1C}">
+                <a14:useLocalDpi xmlns:a14="http://schemas.microsoft.com/office/drawing/2010/main" val="0"/>
+              </a:ext>
+            </a:extLst>
+          </a:blip>
+          <a:stretch>
+            <a:fillRect/>
+          </a:stretch>
+        </p:blipFill>
+        <p:spPr>
+          <a:xfrm>
+            <a:off x="2095024" y="2770188"/>
+            <a:ext cx="4953951" cy="3538537"/>
+          </a:xfrm>
+        </p:spPr>
+      </p:pic>
+    </p:spTree>
+    <p:extLst>
+      <p:ext uri="{BB962C8B-B14F-4D97-AF65-F5344CB8AC3E}">
+        <p14:creationId xmlns:p14="http://schemas.microsoft.com/office/powerpoint/2010/main" val="3971943308"/>
+      </p:ext>
+    </p:extLst>
+  </p:cSld>
+  <p:clrMapOvr>
+    <a:masterClrMapping/>
+  </p:clrMapOvr>
+</p:sld>
+</file>
+
+<file path=ppt/slides/slide13.xml><?xml version="1.0" encoding="utf-8"?>
+<p:sld xmlns:a="http://schemas.openxmlformats.org/drawingml/2006/main" xmlns:r="http://schemas.openxmlformats.org/officeDocument/2006/relationships" xmlns:p="http://schemas.openxmlformats.org/presentationml/2006/main">
+  <p:cSld>
+    <p:spTree>
+      <p:nvGrpSpPr>
+        <p:cNvPr id="1" name=""/>
+        <p:cNvGrpSpPr/>
+        <p:nvPr/>
+      </p:nvGrpSpPr>
+      <p:grpSpPr>
+        <a:xfrm>
+          <a:off x="0" y="0"/>
+          <a:ext cx="0" cy="0"/>
+          <a:chOff x="0" y="0"/>
+          <a:chExt cx="0" cy="0"/>
+        </a:xfrm>
+      </p:grpSpPr>
+      <p:sp>
+        <p:nvSpPr>
+          <p:cNvPr id="2" name="Título 1"/>
+          <p:cNvSpPr>
+            <a:spLocks noGrp="1"/>
+          </p:cNvSpPr>
+          <p:nvPr>
+            <p:ph type="title"/>
+          </p:nvPr>
+        </p:nvSpPr>
+        <p:spPr/>
+        <p:txBody>
+          <a:bodyPr/>
+          <a:lstStyle/>
+          <a:p>
+            <a:r>
+              <a:rPr lang="pt-BR" dirty="0" smtClean="0"/>
+              <a:t>Fórmula 1 - Piedade</a:t>
+            </a:r>
+            <a:endParaRPr lang="pt-BR" dirty="0"/>
+          </a:p>
+        </p:txBody>
+      </p:sp>
+      <p:pic>
+        <p:nvPicPr>
+          <p:cNvPr id="4" name="Espaço Reservado para Conteúdo 3"/>
+          <p:cNvPicPr>
+            <a:picLocks noGrp="1" noChangeAspect="1"/>
+          </p:cNvPicPr>
+          <p:nvPr>
+            <p:ph idx="1"/>
+          </p:nvPr>
+        </p:nvPicPr>
+        <p:blipFill>
+          <a:blip r:embed="rId2">
+            <a:extLst>
+              <a:ext uri="{28A0092B-C50C-407E-A947-70E740481C1C}">
+                <a14:useLocalDpi xmlns:a14="http://schemas.microsoft.com/office/drawing/2010/main" val="0"/>
+              </a:ext>
+            </a:extLst>
+          </a:blip>
+          <a:stretch>
+            <a:fillRect/>
+          </a:stretch>
+        </p:blipFill>
+        <p:spPr>
+          <a:xfrm>
+            <a:off x="2095024" y="2770188"/>
+            <a:ext cx="4953951" cy="3538537"/>
+          </a:xfrm>
+        </p:spPr>
+      </p:pic>
+    </p:spTree>
+    <p:extLst>
+      <p:ext uri="{BB962C8B-B14F-4D97-AF65-F5344CB8AC3E}">
+        <p14:creationId xmlns:p14="http://schemas.microsoft.com/office/powerpoint/2010/main" val="3971943308"/>
+      </p:ext>
+    </p:extLst>
+  </p:cSld>
+  <p:clrMapOvr>
+    <a:masterClrMapping/>
+  </p:clrMapOvr>
+</p:sld>
+</file>
+
+<file path=ppt/slides/slide14.xml><?xml version="1.0" encoding="utf-8"?>
+<p:sld xmlns:a="http://schemas.openxmlformats.org/drawingml/2006/main" xmlns:r="http://schemas.openxmlformats.org/officeDocument/2006/relationships" xmlns:p="http://schemas.openxmlformats.org/presentationml/2006/main">
+  <p:cSld>
+    <p:spTree>
+      <p:nvGrpSpPr>
+        <p:cNvPr id="1" name=""/>
+        <p:cNvGrpSpPr/>
+        <p:nvPr/>
+      </p:nvGrpSpPr>
+      <p:grpSpPr>
+        <a:xfrm>
+          <a:off x="0" y="0"/>
+          <a:ext cx="0" cy="0"/>
+          <a:chOff x="0" y="0"/>
+          <a:chExt cx="0" cy="0"/>
+        </a:xfrm>
+      </p:grpSpPr>
+      <p:sp>
+        <p:nvSpPr>
+          <p:cNvPr id="2" name="Título 1"/>
+          <p:cNvSpPr>
+            <a:spLocks noGrp="1"/>
+          </p:cNvSpPr>
+          <p:nvPr>
+            <p:ph type="title"/>
+          </p:nvPr>
+        </p:nvSpPr>
+        <p:spPr/>
+        <p:txBody>
+          <a:bodyPr/>
+          <a:lstStyle/>
+          <a:p>
+            <a:r>
+              <a:rPr lang="pt-BR" dirty="0" smtClean="0"/>
+              <a:t>Fórmula 1 - Piedade</a:t>
+            </a:r>
+            <a:endParaRPr lang="pt-BR" dirty="0"/>
+          </a:p>
+        </p:txBody>
+      </p:sp>
+      <p:pic>
+        <p:nvPicPr>
+          <p:cNvPr id="4" name="Espaço Reservado para Conteúdo 3"/>
+          <p:cNvPicPr>
+            <a:picLocks noGrp="1" noChangeAspect="1"/>
+          </p:cNvPicPr>
+          <p:nvPr>
+            <p:ph idx="1"/>
+          </p:nvPr>
+        </p:nvPicPr>
+        <p:blipFill>
+          <a:blip r:embed="rId2">
+            <a:extLst>
+              <a:ext uri="{28A0092B-C50C-407E-A947-70E740481C1C}">
+                <a14:useLocalDpi xmlns:a14="http://schemas.microsoft.com/office/drawing/2010/main" val="0"/>
+              </a:ext>
+            </a:extLst>
+          </a:blip>
+          <a:stretch>
+            <a:fillRect/>
+          </a:stretch>
+        </p:blipFill>
+        <p:spPr>
+          <a:xfrm>
+            <a:off x="2095024" y="2770188"/>
+            <a:ext cx="4953951" cy="3538537"/>
+          </a:xfrm>
+        </p:spPr>
+      </p:pic>
+    </p:spTree>
+    <p:extLst>
+      <p:ext uri="{BB962C8B-B14F-4D97-AF65-F5344CB8AC3E}">
+        <p14:creationId xmlns:p14="http://schemas.microsoft.com/office/powerpoint/2010/main" val="3826059362"/>
+      </p:ext>
+    </p:extLst>
+  </p:cSld>
+  <p:clrMapOvr>
+    <a:masterClrMapping/>
+  </p:clrMapOvr>
+</p:sld>
+</file>
+
+<file path=ppt/slides/slide15.xml><?xml version="1.0" encoding="utf-8"?>
+<p:sld xmlns:a="http://schemas.openxmlformats.org/drawingml/2006/main" xmlns:r="http://schemas.openxmlformats.org/officeDocument/2006/relationships" xmlns:p="http://schemas.openxmlformats.org/presentationml/2006/main">
+  <p:cSld>
+    <p:spTree>
+      <p:nvGrpSpPr>
+        <p:cNvPr id="1" name=""/>
+        <p:cNvGrpSpPr/>
+        <p:nvPr/>
+      </p:nvGrpSpPr>
+      <p:grpSpPr>
+        <a:xfrm>
+          <a:off x="0" y="0"/>
+          <a:ext cx="0" cy="0"/>
+          <a:chOff x="0" y="0"/>
+          <a:chExt cx="0" cy="0"/>
+        </a:xfrm>
+      </p:grpSpPr>
+      <p:sp>
+        <p:nvSpPr>
+          <p:cNvPr id="2" name="Título 1"/>
+          <p:cNvSpPr>
+            <a:spLocks noGrp="1"/>
+          </p:cNvSpPr>
+          <p:nvPr>
+            <p:ph type="title"/>
+          </p:nvPr>
+        </p:nvSpPr>
+        <p:spPr/>
+        <p:txBody>
+          <a:bodyPr/>
+          <a:lstStyle/>
+          <a:p>
+            <a:r>
+              <a:rPr lang="pt-BR" dirty="0" smtClean="0"/>
+              <a:t>Fórmula 1 - Piedade</a:t>
+            </a:r>
+            <a:endParaRPr lang="pt-BR" dirty="0"/>
+          </a:p>
+        </p:txBody>
+      </p:sp>
+      <p:pic>
+        <p:nvPicPr>
+          <p:cNvPr id="4" name="Espaço Reservado para Conteúdo 3"/>
+          <p:cNvPicPr>
+            <a:picLocks noGrp="1" noChangeAspect="1"/>
+          </p:cNvPicPr>
+          <p:nvPr>
+            <p:ph idx="1"/>
+          </p:nvPr>
+        </p:nvPicPr>
+        <p:blipFill>
+          <a:blip r:embed="rId2">
+            <a:extLst>
+              <a:ext uri="{28A0092B-C50C-407E-A947-70E740481C1C}">
+                <a14:useLocalDpi xmlns:a14="http://schemas.microsoft.com/office/drawing/2010/main" val="0"/>
+              </a:ext>
+            </a:extLst>
+          </a:blip>
+          <a:stretch>
+            <a:fillRect/>
+          </a:stretch>
+        </p:blipFill>
+        <p:spPr>
+          <a:xfrm>
+            <a:off x="2095024" y="2770188"/>
+            <a:ext cx="4953951" cy="3538537"/>
+          </a:xfrm>
+        </p:spPr>
+      </p:pic>
+    </p:spTree>
+    <p:extLst>
+      <p:ext uri="{BB962C8B-B14F-4D97-AF65-F5344CB8AC3E}">
+        <p14:creationId xmlns:p14="http://schemas.microsoft.com/office/powerpoint/2010/main" val="3826059362"/>
+      </p:ext>
+    </p:extLst>
+  </p:cSld>
+  <p:clrMapOvr>
+    <a:masterClrMapping/>
+  </p:clrMapOvr>
+</p:sld>
+</file>
+
+<file path=ppt/slides/slide16.xml><?xml version="1.0" encoding="utf-8"?>
+<p:sld xmlns:a="http://schemas.openxmlformats.org/drawingml/2006/main" xmlns:r="http://schemas.openxmlformats.org/officeDocument/2006/relationships" xmlns:p="http://schemas.openxmlformats.org/presentationml/2006/main">
+  <p:cSld>
+    <p:spTree>
+      <p:nvGrpSpPr>
+        <p:cNvPr id="1" name=""/>
+        <p:cNvGrpSpPr/>
+        <p:nvPr/>
+      </p:nvGrpSpPr>
+      <p:grpSpPr>
+        <a:xfrm>
+          <a:off x="0" y="0"/>
+          <a:ext cx="0" cy="0"/>
+          <a:chOff x="0" y="0"/>
+          <a:chExt cx="0" cy="0"/>
+        </a:xfrm>
+      </p:grpSpPr>
+      <p:sp>
+        <p:nvSpPr>
+          <p:cNvPr id="2" name="Título 1"/>
+          <p:cNvSpPr>
+            <a:spLocks noGrp="1"/>
+          </p:cNvSpPr>
+          <p:nvPr>
+            <p:ph type="title"/>
+          </p:nvPr>
+        </p:nvSpPr>
+        <p:spPr/>
+        <p:txBody>
+          <a:bodyPr/>
+          <a:lstStyle/>
+          <a:p>
+            <a:r>
+              <a:rPr lang="pt-BR" dirty="0" smtClean="0"/>
+              <a:t>Simulador BDI</a:t>
+            </a:r>
+            <a:endParaRPr lang="pt-BR" dirty="0"/>
+          </a:p>
+        </p:txBody>
+      </p:sp>
+      <p:sp>
+        <p:nvSpPr>
+          <p:cNvPr id="3" name="Espaço Reservado para Conteúdo 2"/>
+          <p:cNvSpPr>
+            <a:spLocks noGrp="1"/>
+          </p:cNvSpPr>
+          <p:nvPr>
+            <p:ph idx="1"/>
+          </p:nvPr>
+        </p:nvSpPr>
+        <p:spPr/>
+        <p:txBody>
+          <a:bodyPr/>
+          <a:lstStyle/>
+          <a:p>
+            <a:r>
+              <a:rPr lang="pt-BR" dirty="0" smtClean="0"/>
+              <a:t>Geração de desejos</a:t>
+            </a:r>
+          </a:p>
+          <a:p>
+            <a:r>
+              <a:rPr lang="pt-BR" dirty="0" smtClean="0"/>
+              <a:t>Fórmula 1: soma de valores &gt; preço * tamanho de plano</a:t>
+            </a:r>
+          </a:p>
+          <a:p>
+            <a:r>
+              <a:rPr lang="pt-BR" dirty="0" smtClean="0"/>
+              <a:t>Fórmula 2: média de valores &gt; preço * tamanho de plano</a:t>
+            </a:r>
+          </a:p>
+          <a:p>
+            <a:pPr lvl="1"/>
+            <a:r>
+              <a:rPr lang="pt-BR" dirty="0" smtClean="0"/>
+              <a:t>Mais restritiva, para tamanhos de plano maiores nenhum desejo é aceitável</a:t>
+            </a:r>
+          </a:p>
+          <a:p>
+            <a:pPr lvl="1"/>
+            <a:r>
+              <a:rPr lang="pt-BR" dirty="0" smtClean="0"/>
+              <a:t>Representativa de consumidor mais frugal?</a:t>
+            </a:r>
+            <a:endParaRPr lang="pt-BR" dirty="0"/>
+          </a:p>
+        </p:txBody>
+      </p:sp>
+    </p:spTree>
+    <p:extLst>
+      <p:ext uri="{BB962C8B-B14F-4D97-AF65-F5344CB8AC3E}">
+        <p14:creationId xmlns:p14="http://schemas.microsoft.com/office/powerpoint/2010/main" val="3439817781"/>
+      </p:ext>
+    </p:extLst>
+  </p:cSld>
+  <p:clrMapOvr>
+    <a:masterClrMapping/>
+  </p:clrMapOvr>
+</p:sld>
+</file>
+
+<file path=ppt/slides/slide17.xml><?xml version="1.0" encoding="utf-8"?>
+<p:sld xmlns:a="http://schemas.openxmlformats.org/drawingml/2006/main" xmlns:r="http://schemas.openxmlformats.org/officeDocument/2006/relationships" xmlns:p="http://schemas.openxmlformats.org/presentationml/2006/main">
+  <p:cSld>
+    <p:spTree>
+      <p:nvGrpSpPr>
+        <p:cNvPr id="1" name=""/>
+        <p:cNvGrpSpPr/>
+        <p:nvPr/>
+      </p:nvGrpSpPr>
+      <p:grpSpPr>
+        <a:xfrm>
+          <a:off x="0" y="0"/>
+          <a:ext cx="0" cy="0"/>
+          <a:chOff x="0" y="0"/>
+          <a:chExt cx="0" cy="0"/>
+        </a:xfrm>
+      </p:grpSpPr>
+      <p:sp>
+        <p:nvSpPr>
+          <p:cNvPr id="2" name="Título 1"/>
+          <p:cNvSpPr>
+            <a:spLocks noGrp="1"/>
+          </p:cNvSpPr>
+          <p:nvPr>
+            <p:ph type="title"/>
+          </p:nvPr>
+        </p:nvSpPr>
+        <p:spPr/>
+        <p:txBody>
+          <a:bodyPr/>
+          <a:lstStyle/>
+          <a:p>
+            <a:r>
+              <a:rPr lang="pt-BR" dirty="0" smtClean="0"/>
+              <a:t>Fórmula 2</a:t>
+            </a:r>
+            <a:endParaRPr lang="pt-BR" dirty="0"/>
+          </a:p>
+        </p:txBody>
+      </p:sp>
+      <p:pic>
+        <p:nvPicPr>
+          <p:cNvPr id="4" name="Espaço Reservado para Conteúdo 3"/>
+          <p:cNvPicPr>
+            <a:picLocks noGrp="1" noChangeAspect="1"/>
+          </p:cNvPicPr>
+          <p:nvPr>
+            <p:ph idx="1"/>
+          </p:nvPr>
+        </p:nvPicPr>
+        <p:blipFill>
+          <a:blip r:embed="rId2">
+            <a:extLst>
+              <a:ext uri="{28A0092B-C50C-407E-A947-70E740481C1C}">
+                <a14:useLocalDpi xmlns:a14="http://schemas.microsoft.com/office/drawing/2010/main" val="0"/>
+              </a:ext>
+            </a:extLst>
+          </a:blip>
+          <a:stretch>
+            <a:fillRect/>
+          </a:stretch>
+        </p:blipFill>
+        <p:spPr>
+          <a:xfrm>
+            <a:off x="2095024" y="2770188"/>
+            <a:ext cx="4953951" cy="3538537"/>
+          </a:xfrm>
+        </p:spPr>
+      </p:pic>
+    </p:spTree>
+    <p:extLst>
+      <p:ext uri="{BB962C8B-B14F-4D97-AF65-F5344CB8AC3E}">
+        <p14:creationId xmlns:p14="http://schemas.microsoft.com/office/powerpoint/2010/main" val="4128485246"/>
+      </p:ext>
+    </p:extLst>
+  </p:cSld>
+  <p:clrMapOvr>
+    <a:masterClrMapping/>
+  </p:clrMapOvr>
+</p:sld>
+</file>
+
+<file path=ppt/slides/slide18.xml><?xml version="1.0" encoding="utf-8"?>
+<p:sld xmlns:a="http://schemas.openxmlformats.org/drawingml/2006/main" xmlns:r="http://schemas.openxmlformats.org/officeDocument/2006/relationships" xmlns:p="http://schemas.openxmlformats.org/presentationml/2006/main">
+  <p:cSld>
+    <p:spTree>
+      <p:nvGrpSpPr>
+        <p:cNvPr id="1" name=""/>
+        <p:cNvGrpSpPr/>
+        <p:nvPr/>
+      </p:nvGrpSpPr>
+      <p:grpSpPr>
+        <a:xfrm>
+          <a:off x="0" y="0"/>
+          <a:ext cx="0" cy="0"/>
+          <a:chOff x="0" y="0"/>
+          <a:chExt cx="0" cy="0"/>
+        </a:xfrm>
+      </p:grpSpPr>
+      <p:sp>
+        <p:nvSpPr>
+          <p:cNvPr id="2" name="Título 1"/>
+          <p:cNvSpPr>
+            <a:spLocks noGrp="1"/>
+          </p:cNvSpPr>
+          <p:nvPr>
+            <p:ph type="title"/>
+          </p:nvPr>
+        </p:nvSpPr>
+        <p:spPr/>
+        <p:txBody>
+          <a:bodyPr/>
+          <a:lstStyle/>
+          <a:p>
+            <a:r>
+              <a:rPr lang="pt-BR" dirty="0" smtClean="0"/>
+              <a:t>Fórmula 2</a:t>
+            </a:r>
+            <a:endParaRPr lang="pt-BR" dirty="0"/>
+          </a:p>
+        </p:txBody>
+      </p:sp>
+      <p:pic>
+        <p:nvPicPr>
+          <p:cNvPr id="4" name="Espaço Reservado para Conteúdo 3"/>
+          <p:cNvPicPr>
+            <a:picLocks noGrp="1" noChangeAspect="1"/>
+          </p:cNvPicPr>
+          <p:nvPr>
+            <p:ph idx="1"/>
+          </p:nvPr>
+        </p:nvPicPr>
+        <p:blipFill>
+          <a:blip r:embed="rId2">
+            <a:extLst>
+              <a:ext uri="{28A0092B-C50C-407E-A947-70E740481C1C}">
+                <a14:useLocalDpi xmlns:a14="http://schemas.microsoft.com/office/drawing/2010/main" val="0"/>
+              </a:ext>
+            </a:extLst>
+          </a:blip>
+          <a:stretch>
+            <a:fillRect/>
+          </a:stretch>
+        </p:blipFill>
+        <p:spPr>
+          <a:xfrm>
+            <a:off x="2095024" y="2770188"/>
+            <a:ext cx="4953951" cy="3538537"/>
+          </a:xfrm>
+        </p:spPr>
+      </p:pic>
+    </p:spTree>
+    <p:extLst>
+      <p:ext uri="{BB962C8B-B14F-4D97-AF65-F5344CB8AC3E}">
+        <p14:creationId xmlns:p14="http://schemas.microsoft.com/office/powerpoint/2010/main" val="529463665"/>
+      </p:ext>
+    </p:extLst>
+  </p:cSld>
+  <p:clrMapOvr>
+    <a:masterClrMapping/>
+  </p:clrMapOvr>
+</p:sld>
+</file>
+
+<file path=ppt/slides/slide19.xml><?xml version="1.0" encoding="utf-8"?>
+<p:sld xmlns:a="http://schemas.openxmlformats.org/drawingml/2006/main" xmlns:r="http://schemas.openxmlformats.org/officeDocument/2006/relationships" xmlns:p="http://schemas.openxmlformats.org/presentationml/2006/main">
+  <p:cSld>
+    <p:spTree>
+      <p:nvGrpSpPr>
+        <p:cNvPr id="1" name=""/>
+        <p:cNvGrpSpPr/>
+        <p:nvPr/>
+      </p:nvGrpSpPr>
+      <p:grpSpPr>
+        <a:xfrm>
+          <a:off x="0" y="0"/>
+          <a:ext cx="0" cy="0"/>
+          <a:chOff x="0" y="0"/>
+          <a:chExt cx="0" cy="0"/>
+        </a:xfrm>
+      </p:grpSpPr>
+      <p:sp>
+        <p:nvSpPr>
+          <p:cNvPr id="2" name="Título 1"/>
+          <p:cNvSpPr>
+            <a:spLocks noGrp="1"/>
+          </p:cNvSpPr>
+          <p:nvPr>
+            <p:ph type="title"/>
+          </p:nvPr>
+        </p:nvSpPr>
+        <p:spPr/>
+        <p:txBody>
+          <a:bodyPr/>
+          <a:lstStyle/>
+          <a:p>
+            <a:r>
+              <a:rPr lang="pt-BR" dirty="0" smtClean="0"/>
+              <a:t>Fórmula 2</a:t>
+            </a:r>
+            <a:endParaRPr lang="pt-BR" dirty="0"/>
+          </a:p>
+        </p:txBody>
+      </p:sp>
+      <p:pic>
+        <p:nvPicPr>
+          <p:cNvPr id="4" name="Espaço Reservado para Conteúdo 3"/>
+          <p:cNvPicPr>
+            <a:picLocks noGrp="1" noChangeAspect="1"/>
+          </p:cNvPicPr>
+          <p:nvPr>
+            <p:ph idx="1"/>
+          </p:nvPr>
+        </p:nvPicPr>
+        <p:blipFill>
+          <a:blip r:embed="rId2">
+            <a:extLst>
+              <a:ext uri="{28A0092B-C50C-407E-A947-70E740481C1C}">
+                <a14:useLocalDpi xmlns:a14="http://schemas.microsoft.com/office/drawing/2010/main" val="0"/>
+              </a:ext>
+            </a:extLst>
+          </a:blip>
+          <a:stretch>
+            <a:fillRect/>
+          </a:stretch>
+        </p:blipFill>
+        <p:spPr>
+          <a:xfrm>
+            <a:off x="2095024" y="2770188"/>
+            <a:ext cx="4953951" cy="3538537"/>
+          </a:xfrm>
+        </p:spPr>
+      </p:pic>
+    </p:spTree>
+    <p:extLst>
+      <p:ext uri="{BB962C8B-B14F-4D97-AF65-F5344CB8AC3E}">
+        <p14:creationId xmlns:p14="http://schemas.microsoft.com/office/powerpoint/2010/main" val="529463665"/>
+      </p:ext>
+    </p:extLst>
+  </p:cSld>
+  <p:clrMapOvr>
+    <a:masterClrMapping/>
+  </p:clrMapOvr>
+</p:sld>
+</file>
+
 <file path=ppt/slides/slide2.xml><?xml version="1.0" encoding="utf-8"?>
 <p:sld xmlns:a="http://schemas.openxmlformats.org/drawingml/2006/main" xmlns:r="http://schemas.openxmlformats.org/officeDocument/2006/relationships" xmlns:p="http://schemas.openxmlformats.org/presentationml/2006/main">
   <p:cSld>
@@ -3657,6 +4520,833 @@
     <p:extLst>
       <p:ext uri="{BB962C8B-B14F-4D97-AF65-F5344CB8AC3E}">
         <p14:creationId xmlns:p14="http://schemas.microsoft.com/office/powerpoint/2010/main" val="4194458956"/>
+      </p:ext>
+    </p:extLst>
+  </p:cSld>
+  <p:clrMapOvr>
+    <a:masterClrMapping/>
+  </p:clrMapOvr>
+</p:sld>
+</file>
+
+<file path=ppt/slides/slide20.xml><?xml version="1.0" encoding="utf-8"?>
+<p:sld xmlns:a="http://schemas.openxmlformats.org/drawingml/2006/main" xmlns:r="http://schemas.openxmlformats.org/officeDocument/2006/relationships" xmlns:p="http://schemas.openxmlformats.org/presentationml/2006/main">
+  <p:cSld>
+    <p:spTree>
+      <p:nvGrpSpPr>
+        <p:cNvPr id="1" name=""/>
+        <p:cNvGrpSpPr/>
+        <p:nvPr/>
+      </p:nvGrpSpPr>
+      <p:grpSpPr>
+        <a:xfrm>
+          <a:off x="0" y="0"/>
+          <a:ext cx="0" cy="0"/>
+          <a:chOff x="0" y="0"/>
+          <a:chExt cx="0" cy="0"/>
+        </a:xfrm>
+      </p:grpSpPr>
+      <p:sp>
+        <p:nvSpPr>
+          <p:cNvPr id="2" name="Título 1"/>
+          <p:cNvSpPr>
+            <a:spLocks noGrp="1"/>
+          </p:cNvSpPr>
+          <p:nvPr>
+            <p:ph type="title"/>
+          </p:nvPr>
+        </p:nvSpPr>
+        <p:spPr/>
+        <p:txBody>
+          <a:bodyPr/>
+          <a:lstStyle/>
+          <a:p>
+            <a:r>
+              <a:rPr lang="pt-BR" dirty="0" smtClean="0"/>
+              <a:t>Fórmula 2 - Piedade</a:t>
+            </a:r>
+            <a:endParaRPr lang="pt-BR" dirty="0"/>
+          </a:p>
+        </p:txBody>
+      </p:sp>
+      <p:pic>
+        <p:nvPicPr>
+          <p:cNvPr id="4" name="Espaço Reservado para Conteúdo 3"/>
+          <p:cNvPicPr>
+            <a:picLocks noGrp="1" noChangeAspect="1"/>
+          </p:cNvPicPr>
+          <p:nvPr>
+            <p:ph idx="1"/>
+          </p:nvPr>
+        </p:nvPicPr>
+        <p:blipFill>
+          <a:blip r:embed="rId2">
+            <a:extLst>
+              <a:ext uri="{28A0092B-C50C-407E-A947-70E740481C1C}">
+                <a14:useLocalDpi xmlns:a14="http://schemas.microsoft.com/office/drawing/2010/main" val="0"/>
+              </a:ext>
+            </a:extLst>
+          </a:blip>
+          <a:stretch>
+            <a:fillRect/>
+          </a:stretch>
+        </p:blipFill>
+        <p:spPr>
+          <a:xfrm>
+            <a:off x="2095024" y="2770188"/>
+            <a:ext cx="4953951" cy="3538537"/>
+          </a:xfrm>
+        </p:spPr>
+      </p:pic>
+    </p:spTree>
+    <p:extLst>
+      <p:ext uri="{BB962C8B-B14F-4D97-AF65-F5344CB8AC3E}">
+        <p14:creationId xmlns:p14="http://schemas.microsoft.com/office/powerpoint/2010/main" val="529463665"/>
+      </p:ext>
+    </p:extLst>
+  </p:cSld>
+  <p:clrMapOvr>
+    <a:masterClrMapping/>
+  </p:clrMapOvr>
+</p:sld>
+</file>
+
+<file path=ppt/slides/slide21.xml><?xml version="1.0" encoding="utf-8"?>
+<p:sld xmlns:a="http://schemas.openxmlformats.org/drawingml/2006/main" xmlns:r="http://schemas.openxmlformats.org/officeDocument/2006/relationships" xmlns:p="http://schemas.openxmlformats.org/presentationml/2006/main">
+  <p:cSld>
+    <p:spTree>
+      <p:nvGrpSpPr>
+        <p:cNvPr id="1" name=""/>
+        <p:cNvGrpSpPr/>
+        <p:nvPr/>
+      </p:nvGrpSpPr>
+      <p:grpSpPr>
+        <a:xfrm>
+          <a:off x="0" y="0"/>
+          <a:ext cx="0" cy="0"/>
+          <a:chOff x="0" y="0"/>
+          <a:chExt cx="0" cy="0"/>
+        </a:xfrm>
+      </p:grpSpPr>
+      <p:sp>
+        <p:nvSpPr>
+          <p:cNvPr id="2" name="Título 1"/>
+          <p:cNvSpPr>
+            <a:spLocks noGrp="1"/>
+          </p:cNvSpPr>
+          <p:nvPr>
+            <p:ph type="title"/>
+          </p:nvPr>
+        </p:nvSpPr>
+        <p:spPr/>
+        <p:txBody>
+          <a:bodyPr/>
+          <a:lstStyle/>
+          <a:p>
+            <a:r>
+              <a:rPr lang="pt-BR" dirty="0" smtClean="0"/>
+              <a:t>Fórmula 2 - Piedade</a:t>
+            </a:r>
+            <a:endParaRPr lang="pt-BR" dirty="0"/>
+          </a:p>
+        </p:txBody>
+      </p:sp>
+      <p:pic>
+        <p:nvPicPr>
+          <p:cNvPr id="4" name="Espaço Reservado para Conteúdo 3"/>
+          <p:cNvPicPr>
+            <a:picLocks noGrp="1" noChangeAspect="1"/>
+          </p:cNvPicPr>
+          <p:nvPr>
+            <p:ph idx="1"/>
+          </p:nvPr>
+        </p:nvPicPr>
+        <p:blipFill>
+          <a:blip r:embed="rId2">
+            <a:extLst>
+              <a:ext uri="{28A0092B-C50C-407E-A947-70E740481C1C}">
+                <a14:useLocalDpi xmlns:a14="http://schemas.microsoft.com/office/drawing/2010/main" val="0"/>
+              </a:ext>
+            </a:extLst>
+          </a:blip>
+          <a:stretch>
+            <a:fillRect/>
+          </a:stretch>
+        </p:blipFill>
+        <p:spPr>
+          <a:xfrm>
+            <a:off x="2095024" y="2770188"/>
+            <a:ext cx="4953951" cy="3538537"/>
+          </a:xfrm>
+        </p:spPr>
+      </p:pic>
+    </p:spTree>
+    <p:extLst>
+      <p:ext uri="{BB962C8B-B14F-4D97-AF65-F5344CB8AC3E}">
+        <p14:creationId xmlns:p14="http://schemas.microsoft.com/office/powerpoint/2010/main" val="1170400731"/>
+      </p:ext>
+    </p:extLst>
+  </p:cSld>
+  <p:clrMapOvr>
+    <a:masterClrMapping/>
+  </p:clrMapOvr>
+</p:sld>
+</file>
+
+<file path=ppt/slides/slide22.xml><?xml version="1.0" encoding="utf-8"?>
+<p:sld xmlns:a="http://schemas.openxmlformats.org/drawingml/2006/main" xmlns:r="http://schemas.openxmlformats.org/officeDocument/2006/relationships" xmlns:p="http://schemas.openxmlformats.org/presentationml/2006/main">
+  <p:cSld>
+    <p:spTree>
+      <p:nvGrpSpPr>
+        <p:cNvPr id="1" name=""/>
+        <p:cNvGrpSpPr/>
+        <p:nvPr/>
+      </p:nvGrpSpPr>
+      <p:grpSpPr>
+        <a:xfrm>
+          <a:off x="0" y="0"/>
+          <a:ext cx="0" cy="0"/>
+          <a:chOff x="0" y="0"/>
+          <a:chExt cx="0" cy="0"/>
+        </a:xfrm>
+      </p:grpSpPr>
+      <p:sp>
+        <p:nvSpPr>
+          <p:cNvPr id="2" name="Título 1"/>
+          <p:cNvSpPr>
+            <a:spLocks noGrp="1"/>
+          </p:cNvSpPr>
+          <p:nvPr>
+            <p:ph type="title"/>
+          </p:nvPr>
+        </p:nvSpPr>
+        <p:spPr/>
+        <p:txBody>
+          <a:bodyPr/>
+          <a:lstStyle/>
+          <a:p>
+            <a:r>
+              <a:rPr lang="pt-BR" dirty="0" smtClean="0"/>
+              <a:t>Fórmula 2 - Piedade</a:t>
+            </a:r>
+            <a:endParaRPr lang="pt-BR" dirty="0"/>
+          </a:p>
+        </p:txBody>
+      </p:sp>
+      <p:pic>
+        <p:nvPicPr>
+          <p:cNvPr id="4" name="Espaço Reservado para Conteúdo 3"/>
+          <p:cNvPicPr>
+            <a:picLocks noGrp="1" noChangeAspect="1"/>
+          </p:cNvPicPr>
+          <p:nvPr>
+            <p:ph idx="1"/>
+          </p:nvPr>
+        </p:nvPicPr>
+        <p:blipFill>
+          <a:blip r:embed="rId2">
+            <a:extLst>
+              <a:ext uri="{28A0092B-C50C-407E-A947-70E740481C1C}">
+                <a14:useLocalDpi xmlns:a14="http://schemas.microsoft.com/office/drawing/2010/main" val="0"/>
+              </a:ext>
+            </a:extLst>
+          </a:blip>
+          <a:stretch>
+            <a:fillRect/>
+          </a:stretch>
+        </p:blipFill>
+        <p:spPr>
+          <a:xfrm>
+            <a:off x="2095024" y="2770188"/>
+            <a:ext cx="4953951" cy="3538537"/>
+          </a:xfrm>
+        </p:spPr>
+      </p:pic>
+    </p:spTree>
+    <p:extLst>
+      <p:ext uri="{BB962C8B-B14F-4D97-AF65-F5344CB8AC3E}">
+        <p14:creationId xmlns:p14="http://schemas.microsoft.com/office/powerpoint/2010/main" val="1170400731"/>
+      </p:ext>
+    </p:extLst>
+  </p:cSld>
+  <p:clrMapOvr>
+    <a:masterClrMapping/>
+  </p:clrMapOvr>
+</p:sld>
+</file>
+
+<file path=ppt/slides/slide23.xml><?xml version="1.0" encoding="utf-8"?>
+<p:sld xmlns:a="http://schemas.openxmlformats.org/drawingml/2006/main" xmlns:r="http://schemas.openxmlformats.org/officeDocument/2006/relationships" xmlns:p="http://schemas.openxmlformats.org/presentationml/2006/main">
+  <p:cSld>
+    <p:spTree>
+      <p:nvGrpSpPr>
+        <p:cNvPr id="1" name=""/>
+        <p:cNvGrpSpPr/>
+        <p:nvPr/>
+      </p:nvGrpSpPr>
+      <p:grpSpPr>
+        <a:xfrm>
+          <a:off x="0" y="0"/>
+          <a:ext cx="0" cy="0"/>
+          <a:chOff x="0" y="0"/>
+          <a:chExt cx="0" cy="0"/>
+        </a:xfrm>
+      </p:grpSpPr>
+      <p:sp>
+        <p:nvSpPr>
+          <p:cNvPr id="2" name="Título 1"/>
+          <p:cNvSpPr>
+            <a:spLocks noGrp="1"/>
+          </p:cNvSpPr>
+          <p:nvPr>
+            <p:ph type="title"/>
+          </p:nvPr>
+        </p:nvSpPr>
+        <p:spPr/>
+        <p:txBody>
+          <a:bodyPr/>
+          <a:lstStyle/>
+          <a:p>
+            <a:r>
+              <a:rPr lang="pt-BR" dirty="0" smtClean="0"/>
+              <a:t>Simulador BDI</a:t>
+            </a:r>
+            <a:endParaRPr lang="pt-BR" dirty="0"/>
+          </a:p>
+        </p:txBody>
+      </p:sp>
+      <p:sp>
+        <p:nvSpPr>
+          <p:cNvPr id="3" name="Espaço Reservado para Conteúdo 2"/>
+          <p:cNvSpPr>
+            <a:spLocks noGrp="1"/>
+          </p:cNvSpPr>
+          <p:nvPr>
+            <p:ph idx="1"/>
+          </p:nvPr>
+        </p:nvSpPr>
+        <p:spPr/>
+        <p:txBody>
+          <a:bodyPr/>
+          <a:lstStyle/>
+          <a:p>
+            <a:r>
+              <a:rPr lang="pt-BR" dirty="0" smtClean="0"/>
+              <a:t>Fixação em tamanho de plano 4, fórmula 1</a:t>
+            </a:r>
+          </a:p>
+          <a:p>
+            <a:r>
+              <a:rPr lang="pt-BR" dirty="0" smtClean="0"/>
+              <a:t>Alto volume de simulações para reduzir variância por aleatoriedade</a:t>
+            </a:r>
+          </a:p>
+          <a:p>
+            <a:pPr lvl="1"/>
+            <a:r>
+              <a:rPr lang="pt-BR" dirty="0" smtClean="0"/>
+              <a:t>30 sets de 10000 consumidores cada</a:t>
+            </a:r>
+            <a:endParaRPr lang="pt-BR" dirty="0"/>
+          </a:p>
+        </p:txBody>
+      </p:sp>
+    </p:spTree>
+    <p:extLst>
+      <p:ext uri="{BB962C8B-B14F-4D97-AF65-F5344CB8AC3E}">
+        <p14:creationId xmlns:p14="http://schemas.microsoft.com/office/powerpoint/2010/main" val="1370191973"/>
+      </p:ext>
+    </p:extLst>
+  </p:cSld>
+  <p:clrMapOvr>
+    <a:masterClrMapping/>
+  </p:clrMapOvr>
+</p:sld>
+</file>
+
+<file path=ppt/slides/slide24.xml><?xml version="1.0" encoding="utf-8"?>
+<p:sld xmlns:a="http://schemas.openxmlformats.org/drawingml/2006/main" xmlns:r="http://schemas.openxmlformats.org/officeDocument/2006/relationships" xmlns:p="http://schemas.openxmlformats.org/presentationml/2006/main">
+  <p:cSld>
+    <p:spTree>
+      <p:nvGrpSpPr>
+        <p:cNvPr id="1" name=""/>
+        <p:cNvGrpSpPr/>
+        <p:nvPr/>
+      </p:nvGrpSpPr>
+      <p:grpSpPr>
+        <a:xfrm>
+          <a:off x="0" y="0"/>
+          <a:ext cx="0" cy="0"/>
+          <a:chOff x="0" y="0"/>
+          <a:chExt cx="0" cy="0"/>
+        </a:xfrm>
+      </p:grpSpPr>
+      <p:sp>
+        <p:nvSpPr>
+          <p:cNvPr id="2" name="Título 1"/>
+          <p:cNvSpPr>
+            <a:spLocks noGrp="1"/>
+          </p:cNvSpPr>
+          <p:nvPr>
+            <p:ph type="title"/>
+          </p:nvPr>
+        </p:nvSpPr>
+        <p:spPr/>
+        <p:txBody>
+          <a:bodyPr/>
+          <a:lstStyle/>
+          <a:p>
+            <a:r>
+              <a:rPr lang="pt-BR" dirty="0" smtClean="0"/>
+              <a:t>Fórmula 1</a:t>
+            </a:r>
+            <a:endParaRPr lang="pt-BR" dirty="0"/>
+          </a:p>
+        </p:txBody>
+      </p:sp>
+      <p:pic>
+        <p:nvPicPr>
+          <p:cNvPr id="5" name="Espaço Reservado para Conteúdo 4"/>
+          <p:cNvPicPr>
+            <a:picLocks noGrp="1" noChangeAspect="1"/>
+          </p:cNvPicPr>
+          <p:nvPr>
+            <p:ph idx="1"/>
+          </p:nvPr>
+        </p:nvPicPr>
+        <p:blipFill>
+          <a:blip r:embed="rId2">
+            <a:extLst>
+              <a:ext uri="{28A0092B-C50C-407E-A947-70E740481C1C}">
+                <a14:useLocalDpi xmlns:a14="http://schemas.microsoft.com/office/drawing/2010/main" val="0"/>
+              </a:ext>
+            </a:extLst>
+          </a:blip>
+          <a:stretch>
+            <a:fillRect/>
+          </a:stretch>
+        </p:blipFill>
+        <p:spPr>
+          <a:xfrm>
+            <a:off x="2095024" y="2770188"/>
+            <a:ext cx="4953951" cy="3538537"/>
+          </a:xfrm>
+        </p:spPr>
+      </p:pic>
+    </p:spTree>
+    <p:extLst>
+      <p:ext uri="{BB962C8B-B14F-4D97-AF65-F5344CB8AC3E}">
+        <p14:creationId xmlns:p14="http://schemas.microsoft.com/office/powerpoint/2010/main" val="3079503277"/>
+      </p:ext>
+    </p:extLst>
+  </p:cSld>
+  <p:clrMapOvr>
+    <a:masterClrMapping/>
+  </p:clrMapOvr>
+</p:sld>
+</file>
+
+<file path=ppt/slides/slide25.xml><?xml version="1.0" encoding="utf-8"?>
+<p:sld xmlns:a="http://schemas.openxmlformats.org/drawingml/2006/main" xmlns:r="http://schemas.openxmlformats.org/officeDocument/2006/relationships" xmlns:p="http://schemas.openxmlformats.org/presentationml/2006/main">
+  <p:cSld>
+    <p:spTree>
+      <p:nvGrpSpPr>
+        <p:cNvPr id="1" name=""/>
+        <p:cNvGrpSpPr/>
+        <p:nvPr/>
+      </p:nvGrpSpPr>
+      <p:grpSpPr>
+        <a:xfrm>
+          <a:off x="0" y="0"/>
+          <a:ext cx="0" cy="0"/>
+          <a:chOff x="0" y="0"/>
+          <a:chExt cx="0" cy="0"/>
+        </a:xfrm>
+      </p:grpSpPr>
+      <p:sp>
+        <p:nvSpPr>
+          <p:cNvPr id="2" name="Título 1"/>
+          <p:cNvSpPr>
+            <a:spLocks noGrp="1"/>
+          </p:cNvSpPr>
+          <p:nvPr>
+            <p:ph type="title"/>
+          </p:nvPr>
+        </p:nvSpPr>
+        <p:spPr/>
+        <p:txBody>
+          <a:bodyPr/>
+          <a:lstStyle/>
+          <a:p>
+            <a:r>
+              <a:rPr lang="pt-BR" dirty="0" smtClean="0"/>
+              <a:t>Fórmula 1</a:t>
+            </a:r>
+            <a:endParaRPr lang="pt-BR" dirty="0"/>
+          </a:p>
+        </p:txBody>
+      </p:sp>
+      <p:pic>
+        <p:nvPicPr>
+          <p:cNvPr id="5" name="Espaço Reservado para Conteúdo 4"/>
+          <p:cNvPicPr>
+            <a:picLocks noGrp="1" noChangeAspect="1"/>
+          </p:cNvPicPr>
+          <p:nvPr>
+            <p:ph idx="1"/>
+          </p:nvPr>
+        </p:nvPicPr>
+        <p:blipFill>
+          <a:blip r:embed="rId2">
+            <a:extLst>
+              <a:ext uri="{28A0092B-C50C-407E-A947-70E740481C1C}">
+                <a14:useLocalDpi xmlns:a14="http://schemas.microsoft.com/office/drawing/2010/main" val="0"/>
+              </a:ext>
+            </a:extLst>
+          </a:blip>
+          <a:stretch>
+            <a:fillRect/>
+          </a:stretch>
+        </p:blipFill>
+        <p:spPr>
+          <a:xfrm>
+            <a:off x="2095024" y="2770188"/>
+            <a:ext cx="4953951" cy="3538537"/>
+          </a:xfrm>
+        </p:spPr>
+      </p:pic>
+    </p:spTree>
+    <p:extLst>
+      <p:ext uri="{BB962C8B-B14F-4D97-AF65-F5344CB8AC3E}">
+        <p14:creationId xmlns:p14="http://schemas.microsoft.com/office/powerpoint/2010/main" val="3079503277"/>
+      </p:ext>
+    </p:extLst>
+  </p:cSld>
+  <p:clrMapOvr>
+    <a:masterClrMapping/>
+  </p:clrMapOvr>
+</p:sld>
+</file>
+
+<file path=ppt/slides/slide26.xml><?xml version="1.0" encoding="utf-8"?>
+<p:sld xmlns:a="http://schemas.openxmlformats.org/drawingml/2006/main" xmlns:r="http://schemas.openxmlformats.org/officeDocument/2006/relationships" xmlns:p="http://schemas.openxmlformats.org/presentationml/2006/main">
+  <p:cSld>
+    <p:spTree>
+      <p:nvGrpSpPr>
+        <p:cNvPr id="1" name=""/>
+        <p:cNvGrpSpPr/>
+        <p:nvPr/>
+      </p:nvGrpSpPr>
+      <p:grpSpPr>
+        <a:xfrm>
+          <a:off x="0" y="0"/>
+          <a:ext cx="0" cy="0"/>
+          <a:chOff x="0" y="0"/>
+          <a:chExt cx="0" cy="0"/>
+        </a:xfrm>
+      </p:grpSpPr>
+      <p:sp>
+        <p:nvSpPr>
+          <p:cNvPr id="2" name="Título 1"/>
+          <p:cNvSpPr>
+            <a:spLocks noGrp="1"/>
+          </p:cNvSpPr>
+          <p:nvPr>
+            <p:ph type="title"/>
+          </p:nvPr>
+        </p:nvSpPr>
+        <p:spPr/>
+        <p:txBody>
+          <a:bodyPr/>
+          <a:lstStyle/>
+          <a:p>
+            <a:r>
+              <a:rPr lang="pt-BR" dirty="0" smtClean="0"/>
+              <a:t>Fórmula 1</a:t>
+            </a:r>
+            <a:endParaRPr lang="pt-BR" dirty="0"/>
+          </a:p>
+        </p:txBody>
+      </p:sp>
+      <p:pic>
+        <p:nvPicPr>
+          <p:cNvPr id="5" name="Espaço Reservado para Conteúdo 4"/>
+          <p:cNvPicPr>
+            <a:picLocks noGrp="1" noChangeAspect="1"/>
+          </p:cNvPicPr>
+          <p:nvPr>
+            <p:ph idx="1"/>
+          </p:nvPr>
+        </p:nvPicPr>
+        <p:blipFill>
+          <a:blip r:embed="rId2">
+            <a:extLst>
+              <a:ext uri="{28A0092B-C50C-407E-A947-70E740481C1C}">
+                <a14:useLocalDpi xmlns:a14="http://schemas.microsoft.com/office/drawing/2010/main" val="0"/>
+              </a:ext>
+            </a:extLst>
+          </a:blip>
+          <a:stretch>
+            <a:fillRect/>
+          </a:stretch>
+        </p:blipFill>
+        <p:spPr>
+          <a:xfrm>
+            <a:off x="2095024" y="2770188"/>
+            <a:ext cx="4953951" cy="3538537"/>
+          </a:xfrm>
+        </p:spPr>
+      </p:pic>
+    </p:spTree>
+    <p:extLst>
+      <p:ext uri="{BB962C8B-B14F-4D97-AF65-F5344CB8AC3E}">
+        <p14:creationId xmlns:p14="http://schemas.microsoft.com/office/powerpoint/2010/main" val="3079503277"/>
+      </p:ext>
+    </p:extLst>
+  </p:cSld>
+  <p:clrMapOvr>
+    <a:masterClrMapping/>
+  </p:clrMapOvr>
+</p:sld>
+</file>
+
+<file path=ppt/slides/slide27.xml><?xml version="1.0" encoding="utf-8"?>
+<p:sld xmlns:a="http://schemas.openxmlformats.org/drawingml/2006/main" xmlns:r="http://schemas.openxmlformats.org/officeDocument/2006/relationships" xmlns:p="http://schemas.openxmlformats.org/presentationml/2006/main">
+  <p:cSld>
+    <p:spTree>
+      <p:nvGrpSpPr>
+        <p:cNvPr id="1" name=""/>
+        <p:cNvGrpSpPr/>
+        <p:nvPr/>
+      </p:nvGrpSpPr>
+      <p:grpSpPr>
+        <a:xfrm>
+          <a:off x="0" y="0"/>
+          <a:ext cx="0" cy="0"/>
+          <a:chOff x="0" y="0"/>
+          <a:chExt cx="0" cy="0"/>
+        </a:xfrm>
+      </p:grpSpPr>
+      <p:sp>
+        <p:nvSpPr>
+          <p:cNvPr id="2" name="Título 1"/>
+          <p:cNvSpPr>
+            <a:spLocks noGrp="1"/>
+          </p:cNvSpPr>
+          <p:nvPr>
+            <p:ph type="title"/>
+          </p:nvPr>
+        </p:nvSpPr>
+        <p:spPr/>
+        <p:txBody>
+          <a:bodyPr/>
+          <a:lstStyle/>
+          <a:p>
+            <a:r>
+              <a:rPr lang="pt-BR" dirty="0" smtClean="0"/>
+              <a:t>Fórmula 1 - Piedade</a:t>
+            </a:r>
+            <a:endParaRPr lang="pt-BR" dirty="0"/>
+          </a:p>
+        </p:txBody>
+      </p:sp>
+      <p:pic>
+        <p:nvPicPr>
+          <p:cNvPr id="7" name="Espaço Reservado para Conteúdo 6"/>
+          <p:cNvPicPr>
+            <a:picLocks noGrp="1" noChangeAspect="1"/>
+          </p:cNvPicPr>
+          <p:nvPr>
+            <p:ph idx="1"/>
+          </p:nvPr>
+        </p:nvPicPr>
+        <p:blipFill>
+          <a:blip r:embed="rId2">
+            <a:extLst>
+              <a:ext uri="{28A0092B-C50C-407E-A947-70E740481C1C}">
+                <a14:useLocalDpi xmlns:a14="http://schemas.microsoft.com/office/drawing/2010/main" val="0"/>
+              </a:ext>
+            </a:extLst>
+          </a:blip>
+          <a:stretch>
+            <a:fillRect/>
+          </a:stretch>
+        </p:blipFill>
+        <p:spPr>
+          <a:xfrm>
+            <a:off x="2095024" y="2770188"/>
+            <a:ext cx="4953951" cy="3538537"/>
+          </a:xfrm>
+        </p:spPr>
+      </p:pic>
+    </p:spTree>
+    <p:extLst>
+      <p:ext uri="{BB962C8B-B14F-4D97-AF65-F5344CB8AC3E}">
+        <p14:creationId xmlns:p14="http://schemas.microsoft.com/office/powerpoint/2010/main" val="4288431332"/>
+      </p:ext>
+    </p:extLst>
+  </p:cSld>
+  <p:clrMapOvr>
+    <a:masterClrMapping/>
+  </p:clrMapOvr>
+</p:sld>
+</file>
+
+<file path=ppt/slides/slide28.xml><?xml version="1.0" encoding="utf-8"?>
+<p:sld xmlns:a="http://schemas.openxmlformats.org/drawingml/2006/main" xmlns:r="http://schemas.openxmlformats.org/officeDocument/2006/relationships" xmlns:p="http://schemas.openxmlformats.org/presentationml/2006/main">
+  <p:cSld>
+    <p:spTree>
+      <p:nvGrpSpPr>
+        <p:cNvPr id="1" name=""/>
+        <p:cNvGrpSpPr/>
+        <p:nvPr/>
+      </p:nvGrpSpPr>
+      <p:grpSpPr>
+        <a:xfrm>
+          <a:off x="0" y="0"/>
+          <a:ext cx="0" cy="0"/>
+          <a:chOff x="0" y="0"/>
+          <a:chExt cx="0" cy="0"/>
+        </a:xfrm>
+      </p:grpSpPr>
+      <p:sp>
+        <p:nvSpPr>
+          <p:cNvPr id="2" name="Título 1"/>
+          <p:cNvSpPr>
+            <a:spLocks noGrp="1"/>
+          </p:cNvSpPr>
+          <p:nvPr>
+            <p:ph type="title"/>
+          </p:nvPr>
+        </p:nvSpPr>
+        <p:spPr/>
+        <p:txBody>
+          <a:bodyPr/>
+          <a:lstStyle/>
+          <a:p>
+            <a:r>
+              <a:rPr lang="pt-BR" dirty="0" smtClean="0"/>
+              <a:t>Fórmula 1 - Piedade</a:t>
+            </a:r>
+            <a:endParaRPr lang="pt-BR" dirty="0"/>
+          </a:p>
+        </p:txBody>
+      </p:sp>
+      <p:pic>
+        <p:nvPicPr>
+          <p:cNvPr id="7" name="Espaço Reservado para Conteúdo 6"/>
+          <p:cNvPicPr>
+            <a:picLocks noGrp="1" noChangeAspect="1"/>
+          </p:cNvPicPr>
+          <p:nvPr>
+            <p:ph idx="1"/>
+          </p:nvPr>
+        </p:nvPicPr>
+        <p:blipFill>
+          <a:blip r:embed="rId2">
+            <a:extLst>
+              <a:ext uri="{28A0092B-C50C-407E-A947-70E740481C1C}">
+                <a14:useLocalDpi xmlns:a14="http://schemas.microsoft.com/office/drawing/2010/main" val="0"/>
+              </a:ext>
+            </a:extLst>
+          </a:blip>
+          <a:stretch>
+            <a:fillRect/>
+          </a:stretch>
+        </p:blipFill>
+        <p:spPr>
+          <a:xfrm>
+            <a:off x="2095024" y="2770188"/>
+            <a:ext cx="4953951" cy="3538537"/>
+          </a:xfrm>
+        </p:spPr>
+      </p:pic>
+    </p:spTree>
+    <p:extLst>
+      <p:ext uri="{BB962C8B-B14F-4D97-AF65-F5344CB8AC3E}">
+        <p14:creationId xmlns:p14="http://schemas.microsoft.com/office/powerpoint/2010/main" val="4288431332"/>
+      </p:ext>
+    </p:extLst>
+  </p:cSld>
+  <p:clrMapOvr>
+    <a:masterClrMapping/>
+  </p:clrMapOvr>
+</p:sld>
+</file>
+
+<file path=ppt/slides/slide29.xml><?xml version="1.0" encoding="utf-8"?>
+<p:sld xmlns:a="http://schemas.openxmlformats.org/drawingml/2006/main" xmlns:r="http://schemas.openxmlformats.org/officeDocument/2006/relationships" xmlns:p="http://schemas.openxmlformats.org/presentationml/2006/main">
+  <p:cSld>
+    <p:spTree>
+      <p:nvGrpSpPr>
+        <p:cNvPr id="1" name=""/>
+        <p:cNvGrpSpPr/>
+        <p:nvPr/>
+      </p:nvGrpSpPr>
+      <p:grpSpPr>
+        <a:xfrm>
+          <a:off x="0" y="0"/>
+          <a:ext cx="0" cy="0"/>
+          <a:chOff x="0" y="0"/>
+          <a:chExt cx="0" cy="0"/>
+        </a:xfrm>
+      </p:grpSpPr>
+      <p:sp>
+        <p:nvSpPr>
+          <p:cNvPr id="2" name="Título 1"/>
+          <p:cNvSpPr>
+            <a:spLocks noGrp="1"/>
+          </p:cNvSpPr>
+          <p:nvPr>
+            <p:ph type="title"/>
+          </p:nvPr>
+        </p:nvSpPr>
+        <p:spPr/>
+        <p:txBody>
+          <a:bodyPr/>
+          <a:lstStyle/>
+          <a:p>
+            <a:r>
+              <a:rPr lang="pt-BR" dirty="0" smtClean="0"/>
+              <a:t>Fórmula 1 - Piedade</a:t>
+            </a:r>
+            <a:endParaRPr lang="pt-BR" dirty="0"/>
+          </a:p>
+        </p:txBody>
+      </p:sp>
+      <p:pic>
+        <p:nvPicPr>
+          <p:cNvPr id="7" name="Espaço Reservado para Conteúdo 6"/>
+          <p:cNvPicPr>
+            <a:picLocks noGrp="1" noChangeAspect="1"/>
+          </p:cNvPicPr>
+          <p:nvPr>
+            <p:ph idx="1"/>
+          </p:nvPr>
+        </p:nvPicPr>
+        <p:blipFill>
+          <a:blip r:embed="rId2">
+            <a:extLst>
+              <a:ext uri="{28A0092B-C50C-407E-A947-70E740481C1C}">
+                <a14:useLocalDpi xmlns:a14="http://schemas.microsoft.com/office/drawing/2010/main" val="0"/>
+              </a:ext>
+            </a:extLst>
+          </a:blip>
+          <a:stretch>
+            <a:fillRect/>
+          </a:stretch>
+        </p:blipFill>
+        <p:spPr>
+          <a:xfrm>
+            <a:off x="2095024" y="2770188"/>
+            <a:ext cx="4953951" cy="3538537"/>
+          </a:xfrm>
+        </p:spPr>
+      </p:pic>
+    </p:spTree>
+    <p:extLst>
+      <p:ext uri="{BB962C8B-B14F-4D97-AF65-F5344CB8AC3E}">
+        <p14:creationId xmlns:p14="http://schemas.microsoft.com/office/powerpoint/2010/main" val="4288431332"/>
       </p:ext>
     </p:extLst>
   </p:cSld>
@@ -4028,7 +5718,6 @@
               <a:rPr lang="pt-BR" dirty="0"/>
               <a:t>Revisão Sistemática de Literatura</a:t>
             </a:r>
-            <a:endParaRPr lang="pt-BR" dirty="0"/>
           </a:p>
         </p:txBody>
       </p:sp>
@@ -4061,7 +5750,52 @@
           <a:p>
             <a:r>
               <a:rPr lang="pt-BR" dirty="0" smtClean="0"/>
-              <a:t>Demostraram uma falta de estudos longitudinais </a:t>
+              <a:t>Há vários estudos transversais</a:t>
+            </a:r>
+          </a:p>
+          <a:p>
+            <a:r>
+              <a:rPr lang="pt-BR" dirty="0" smtClean="0"/>
+              <a:t>Diversos experimentos demonstrando uma ligação entre uso de </a:t>
+            </a:r>
+            <a:r>
+              <a:rPr lang="pt-BR" dirty="0" err="1" smtClean="0"/>
+              <a:t>lootboxes</a:t>
+            </a:r>
+            <a:r>
+              <a:rPr lang="pt-BR" dirty="0" smtClean="0"/>
+              <a:t> e sintomas relacionados a vício em jogos de azar</a:t>
+            </a:r>
+          </a:p>
+          <a:p>
+            <a:r>
+              <a:rPr lang="pt-BR" dirty="0" smtClean="0"/>
+              <a:t>Acusaram uma falta de estudos longitudinais, além de questão sobre a direção da ligação</a:t>
+            </a:r>
+          </a:p>
+          <a:p>
+            <a:pPr lvl="1"/>
+            <a:r>
+              <a:rPr lang="pt-BR" dirty="0" err="1" smtClean="0"/>
+              <a:t>Lootboxes</a:t>
+            </a:r>
+            <a:r>
+              <a:rPr lang="pt-BR" dirty="0" smtClean="0"/>
+              <a:t> -&gt; sintomas ou sintomas -&gt; </a:t>
+            </a:r>
+            <a:r>
+              <a:rPr lang="pt-BR" dirty="0" err="1" smtClean="0"/>
+              <a:t>lootboxes</a:t>
+            </a:r>
+            <a:r>
+              <a:rPr lang="pt-BR" dirty="0" smtClean="0"/>
+              <a:t>?</a:t>
+            </a:r>
+          </a:p>
+          <a:p>
+            <a:r>
+              <a:rPr lang="pt-BR" dirty="0" smtClean="0"/>
+              <a:t>Artefato simulador</a:t>
             </a:r>
             <a:endParaRPr lang="pt-BR" dirty="0"/>
           </a:p>
@@ -4071,6 +5805,269 @@
     <p:extLst>
       <p:ext uri="{BB962C8B-B14F-4D97-AF65-F5344CB8AC3E}">
         <p14:creationId xmlns:p14="http://schemas.microsoft.com/office/powerpoint/2010/main" val="1863082590"/>
+      </p:ext>
+    </p:extLst>
+  </p:cSld>
+  <p:clrMapOvr>
+    <a:masterClrMapping/>
+  </p:clrMapOvr>
+</p:sld>
+</file>
+
+<file path=ppt/slides/slide7.xml><?xml version="1.0" encoding="utf-8"?>
+<p:sld xmlns:a="http://schemas.openxmlformats.org/drawingml/2006/main" xmlns:r="http://schemas.openxmlformats.org/officeDocument/2006/relationships" xmlns:p="http://schemas.openxmlformats.org/presentationml/2006/main">
+  <p:cSld>
+    <p:spTree>
+      <p:nvGrpSpPr>
+        <p:cNvPr id="1" name=""/>
+        <p:cNvGrpSpPr/>
+        <p:nvPr/>
+      </p:nvGrpSpPr>
+      <p:grpSpPr>
+        <a:xfrm>
+          <a:off x="0" y="0"/>
+          <a:ext cx="0" cy="0"/>
+          <a:chOff x="0" y="0"/>
+          <a:chExt cx="0" cy="0"/>
+        </a:xfrm>
+      </p:grpSpPr>
+      <p:sp>
+        <p:nvSpPr>
+          <p:cNvPr id="2" name="Título 1"/>
+          <p:cNvSpPr>
+            <a:spLocks noGrp="1"/>
+          </p:cNvSpPr>
+          <p:nvPr>
+            <p:ph type="title"/>
+          </p:nvPr>
+        </p:nvSpPr>
+        <p:spPr/>
+        <p:txBody>
+          <a:bodyPr/>
+          <a:lstStyle/>
+          <a:p>
+            <a:r>
+              <a:rPr lang="pt-BR" dirty="0" smtClean="0"/>
+              <a:t>Simulador BDI</a:t>
+            </a:r>
+            <a:endParaRPr lang="pt-BR" dirty="0"/>
+          </a:p>
+        </p:txBody>
+      </p:sp>
+      <p:sp>
+        <p:nvSpPr>
+          <p:cNvPr id="3" name="Espaço Reservado para Conteúdo 2"/>
+          <p:cNvSpPr>
+            <a:spLocks noGrp="1"/>
+          </p:cNvSpPr>
+          <p:nvPr>
+            <p:ph idx="1"/>
+          </p:nvPr>
+        </p:nvSpPr>
+        <p:spPr/>
+        <p:txBody>
+          <a:bodyPr/>
+          <a:lstStyle/>
+          <a:p>
+            <a:r>
+              <a:rPr lang="pt-BR" dirty="0" smtClean="0"/>
+              <a:t>Simulador de consumidores de </a:t>
+            </a:r>
+            <a:r>
+              <a:rPr lang="pt-BR" dirty="0" err="1" smtClean="0"/>
+              <a:t>lootboxes</a:t>
+            </a:r>
+            <a:endParaRPr lang="pt-BR" dirty="0" smtClean="0"/>
+          </a:p>
+          <a:p>
+            <a:r>
+              <a:rPr lang="pt-BR" dirty="0" smtClean="0"/>
+              <a:t>Permite realizar experimentos em larga escala</a:t>
+            </a:r>
+          </a:p>
+          <a:p>
+            <a:r>
+              <a:rPr lang="pt-BR" dirty="0" smtClean="0"/>
+              <a:t>Demonstrar se há necessidade de experimentos longitudinais com pessoas via resultados</a:t>
+            </a:r>
+          </a:p>
+          <a:p>
+            <a:r>
+              <a:rPr lang="pt-BR" dirty="0" smtClean="0"/>
+              <a:t>Determinar ponto chave do ciclo vicioso presente no uso de </a:t>
+            </a:r>
+            <a:r>
+              <a:rPr lang="pt-BR" dirty="0" err="1" smtClean="0"/>
+              <a:t>lootboxes</a:t>
+            </a:r>
+            <a:r>
+              <a:rPr lang="pt-BR" dirty="0" smtClean="0"/>
+              <a:t>, e como pode ser amenizado</a:t>
+            </a:r>
+            <a:endParaRPr lang="pt-BR" dirty="0"/>
+          </a:p>
+        </p:txBody>
+      </p:sp>
+    </p:spTree>
+    <p:extLst>
+      <p:ext uri="{BB962C8B-B14F-4D97-AF65-F5344CB8AC3E}">
+        <p14:creationId xmlns:p14="http://schemas.microsoft.com/office/powerpoint/2010/main" val="357172987"/>
+      </p:ext>
+    </p:extLst>
+  </p:cSld>
+  <p:clrMapOvr>
+    <a:masterClrMapping/>
+  </p:clrMapOvr>
+</p:sld>
+</file>
+
+<file path=ppt/slides/slide8.xml><?xml version="1.0" encoding="utf-8"?>
+<p:sld xmlns:a="http://schemas.openxmlformats.org/drawingml/2006/main" xmlns:r="http://schemas.openxmlformats.org/officeDocument/2006/relationships" xmlns:p="http://schemas.openxmlformats.org/presentationml/2006/main">
+  <p:cSld>
+    <p:spTree>
+      <p:nvGrpSpPr>
+        <p:cNvPr id="1" name=""/>
+        <p:cNvGrpSpPr/>
+        <p:nvPr/>
+      </p:nvGrpSpPr>
+      <p:grpSpPr>
+        <a:xfrm>
+          <a:off x="0" y="0"/>
+          <a:ext cx="0" cy="0"/>
+          <a:chOff x="0" y="0"/>
+          <a:chExt cx="0" cy="0"/>
+        </a:xfrm>
+      </p:grpSpPr>
+      <p:pic>
+        <p:nvPicPr>
+          <p:cNvPr id="3" name="Imagem 2"/>
+          <p:cNvPicPr>
+            <a:picLocks noChangeAspect="1"/>
+          </p:cNvPicPr>
+          <p:nvPr/>
+        </p:nvPicPr>
+        <p:blipFill>
+          <a:blip r:embed="rId2">
+            <a:extLst>
+              <a:ext uri="{28A0092B-C50C-407E-A947-70E740481C1C}">
+                <a14:useLocalDpi xmlns:a14="http://schemas.microsoft.com/office/drawing/2010/main" val="0"/>
+              </a:ext>
+            </a:extLst>
+          </a:blip>
+          <a:stretch>
+            <a:fillRect/>
+          </a:stretch>
+        </p:blipFill>
+        <p:spPr>
+          <a:xfrm>
+            <a:off x="201782" y="0"/>
+            <a:ext cx="8740435" cy="6858000"/>
+          </a:xfrm>
+          <a:prstGeom prst="rect">
+            <a:avLst/>
+          </a:prstGeom>
+        </p:spPr>
+      </p:pic>
+    </p:spTree>
+    <p:extLst>
+      <p:ext uri="{BB962C8B-B14F-4D97-AF65-F5344CB8AC3E}">
+        <p14:creationId xmlns:p14="http://schemas.microsoft.com/office/powerpoint/2010/main" val="118580775"/>
+      </p:ext>
+    </p:extLst>
+  </p:cSld>
+  <p:clrMapOvr>
+    <a:masterClrMapping/>
+  </p:clrMapOvr>
+</p:sld>
+</file>
+
+<file path=ppt/slides/slide9.xml><?xml version="1.0" encoding="utf-8"?>
+<p:sld xmlns:a="http://schemas.openxmlformats.org/drawingml/2006/main" xmlns:r="http://schemas.openxmlformats.org/officeDocument/2006/relationships" xmlns:p="http://schemas.openxmlformats.org/presentationml/2006/main">
+  <p:cSld>
+    <p:spTree>
+      <p:nvGrpSpPr>
+        <p:cNvPr id="1" name=""/>
+        <p:cNvGrpSpPr/>
+        <p:nvPr/>
+      </p:nvGrpSpPr>
+      <p:grpSpPr>
+        <a:xfrm>
+          <a:off x="0" y="0"/>
+          <a:ext cx="0" cy="0"/>
+          <a:chOff x="0" y="0"/>
+          <a:chExt cx="0" cy="0"/>
+        </a:xfrm>
+      </p:grpSpPr>
+      <p:sp>
+        <p:nvSpPr>
+          <p:cNvPr id="2" name="Título 1"/>
+          <p:cNvSpPr>
+            <a:spLocks noGrp="1"/>
+          </p:cNvSpPr>
+          <p:nvPr>
+            <p:ph type="title"/>
+          </p:nvPr>
+        </p:nvSpPr>
+        <p:spPr/>
+        <p:txBody>
+          <a:bodyPr/>
+          <a:lstStyle/>
+          <a:p>
+            <a:r>
+              <a:rPr lang="pt-BR" dirty="0" smtClean="0"/>
+              <a:t>Simulador BDI</a:t>
+            </a:r>
+            <a:endParaRPr lang="pt-BR" dirty="0"/>
+          </a:p>
+        </p:txBody>
+      </p:sp>
+      <p:sp>
+        <p:nvSpPr>
+          <p:cNvPr id="3" name="Espaço Reservado para Conteúdo 2"/>
+          <p:cNvSpPr>
+            <a:spLocks noGrp="1"/>
+          </p:cNvSpPr>
+          <p:nvPr>
+            <p:ph idx="1"/>
+          </p:nvPr>
+        </p:nvSpPr>
+        <p:spPr/>
+        <p:txBody>
+          <a:bodyPr/>
+          <a:lstStyle/>
+          <a:p>
+            <a:r>
+              <a:rPr lang="pt-BR" dirty="0" smtClean="0"/>
+              <a:t>Ponto crucial: ativação do modo instinto</a:t>
+            </a:r>
+          </a:p>
+          <a:p>
+            <a:r>
+              <a:rPr lang="pt-BR" dirty="0" smtClean="0"/>
+              <a:t>Amenização: sistema de “piedade”</a:t>
+            </a:r>
+          </a:p>
+          <a:p>
+            <a:pPr lvl="1"/>
+            <a:r>
+              <a:rPr lang="pt-BR" dirty="0" smtClean="0"/>
+              <a:t>Após tantas compras, o consumidor é permitido escolher o que quer</a:t>
+            </a:r>
+          </a:p>
+          <a:p>
+            <a:pPr lvl="1"/>
+            <a:r>
+              <a:rPr lang="pt-BR" dirty="0" smtClean="0"/>
+              <a:t>Permite evitar longas sequências de compras sem inviabilizar a prática</a:t>
+            </a:r>
+            <a:endParaRPr lang="pt-BR" dirty="0"/>
+          </a:p>
+        </p:txBody>
+      </p:sp>
+    </p:spTree>
+    <p:extLst>
+      <p:ext uri="{BB962C8B-B14F-4D97-AF65-F5344CB8AC3E}">
+        <p14:creationId xmlns:p14="http://schemas.microsoft.com/office/powerpoint/2010/main" val="1732989605"/>
       </p:ext>
     </p:extLst>
   </p:cSld>

</xml_diff>